<commit_message>
📄 fixed typo in presentation
</commit_message>
<xml_diff>
--- a/Hackathon22_presentation.pptx
+++ b/Hackathon22_presentation.pptx
@@ -221,7 +221,7 @@
           <a:p>
             <a:fld id="{5E670D06-4968-4B6F-B38F-C2AFF935C2B5}" type="datetimeFigureOut">
               <a:rPr lang="en-GB" smtClean="0"/>
-              <a:t>13/03/2022</a:t>
+              <a:t>14/03/2022</a:t>
             </a:fld>
             <a:endParaRPr lang="en-GB"/>
           </a:p>
@@ -2007,7 +2007,7 @@
           <a:p>
             <a:fld id="{07ADAD2A-6B05-4C52-89C5-2ED8B8DFBC77}" type="datetime1">
               <a:rPr lang="en-US" smtClean="0"/>
-              <a:t>3/13/2022</a:t>
+              <a:t>3/14/2022</a:t>
             </a:fld>
             <a:endParaRPr lang="en-US"/>
           </a:p>
@@ -2175,7 +2175,7 @@
           <a:p>
             <a:fld id="{F0C17E15-E137-4FC8-8D7A-33106CE9DBA5}" type="datetime1">
               <a:rPr lang="en-US" smtClean="0"/>
-              <a:t>3/13/2022</a:t>
+              <a:t>3/14/2022</a:t>
             </a:fld>
             <a:endParaRPr lang="en-US"/>
           </a:p>
@@ -2353,7 +2353,7 @@
           <a:p>
             <a:fld id="{E7771123-D4A6-45B2-BC5A-923DF10E29E2}" type="datetime1">
               <a:rPr lang="en-US" smtClean="0"/>
-              <a:t>3/13/2022</a:t>
+              <a:t>3/14/2022</a:t>
             </a:fld>
             <a:endParaRPr lang="en-US"/>
           </a:p>
@@ -2521,7 +2521,7 @@
           <a:p>
             <a:fld id="{45454653-0E04-40A8-8D9B-42A704E89EB7}" type="datetime1">
               <a:rPr lang="en-US" smtClean="0"/>
-              <a:t>3/13/2022</a:t>
+              <a:t>3/14/2022</a:t>
             </a:fld>
             <a:endParaRPr lang="en-US"/>
           </a:p>
@@ -2766,7 +2766,7 @@
           <a:p>
             <a:fld id="{2D65EE16-F76D-4918-8C89-EDD3503A7B8B}" type="datetime1">
               <a:rPr lang="en-US" smtClean="0"/>
-              <a:t>3/13/2022</a:t>
+              <a:t>3/14/2022</a:t>
             </a:fld>
             <a:endParaRPr lang="en-US"/>
           </a:p>
@@ -2995,7 +2995,7 @@
           <a:p>
             <a:fld id="{C23AE2BA-95D7-450B-B03A-64BA361E9B3F}" type="datetime1">
               <a:rPr lang="en-US" smtClean="0"/>
-              <a:t>3/13/2022</a:t>
+              <a:t>3/14/2022</a:t>
             </a:fld>
             <a:endParaRPr lang="en-US"/>
           </a:p>
@@ -3359,7 +3359,7 @@
           <a:p>
             <a:fld id="{987DBAE0-C1BA-4919-BA71-B3B7FD7542CC}" type="datetime1">
               <a:rPr lang="en-US" smtClean="0"/>
-              <a:t>3/13/2022</a:t>
+              <a:t>3/14/2022</a:t>
             </a:fld>
             <a:endParaRPr lang="en-US"/>
           </a:p>
@@ -3476,7 +3476,7 @@
           <a:p>
             <a:fld id="{67ECBF22-E37E-4376-A3B5-C42672E6CD49}" type="datetime1">
               <a:rPr lang="en-US" smtClean="0"/>
-              <a:t>3/13/2022</a:t>
+              <a:t>3/14/2022</a:t>
             </a:fld>
             <a:endParaRPr lang="en-US"/>
           </a:p>
@@ -3571,7 +3571,7 @@
           <a:p>
             <a:fld id="{2177CAC3-F0A2-4127-8549-6BB09C024887}" type="datetime1">
               <a:rPr lang="en-US" smtClean="0"/>
-              <a:t>3/13/2022</a:t>
+              <a:t>3/14/2022</a:t>
             </a:fld>
             <a:endParaRPr lang="en-US"/>
           </a:p>
@@ -3846,7 +3846,7 @@
           <a:p>
             <a:fld id="{761C5160-E324-4F43-9E3B-848755980535}" type="datetime1">
               <a:rPr lang="en-US" smtClean="0"/>
-              <a:t>3/13/2022</a:t>
+              <a:t>3/14/2022</a:t>
             </a:fld>
             <a:endParaRPr lang="en-US"/>
           </a:p>
@@ -4101,7 +4101,7 @@
           <a:p>
             <a:fld id="{E31E842B-26CC-49DD-AEE4-09505D6061F8}" type="datetime1">
               <a:rPr lang="en-US" smtClean="0"/>
-              <a:t>3/13/2022</a:t>
+              <a:t>3/14/2022</a:t>
             </a:fld>
             <a:endParaRPr lang="en-US"/>
           </a:p>
@@ -4312,7 +4312,7 @@
           <a:p>
             <a:fld id="{87187990-7F21-491E-9887-B38B6A51333A}" type="datetime1">
               <a:rPr lang="en-US" smtClean="0"/>
-              <a:t>3/13/2022</a:t>
+              <a:t>3/14/2022</a:t>
             </a:fld>
             <a:endParaRPr lang="en-US"/>
           </a:p>
@@ -5775,7 +5775,7 @@
         </p:blipFill>
         <p:spPr>
           <a:xfrm>
-            <a:off x="496866" y="2099798"/>
+            <a:off x="521714" y="2147743"/>
             <a:ext cx="5488487" cy="4391169"/>
           </a:xfrm>
           <a:prstGeom prst="rect">
@@ -5867,6 +5867,66 @@
               <a:ea typeface="Calibri"/>
               <a:cs typeface="Calibri"/>
             </a:endParaRPr>
+          </a:p>
+        </p:txBody>
+      </p:sp>
+      <p:sp>
+        <p:nvSpPr>
+          <p:cNvPr id="3" name="TextBox 2">
+            <a:extLst>
+              <a:ext uri="{FF2B5EF4-FFF2-40B4-BE49-F238E27FC236}">
+                <a16:creationId xmlns:a16="http://schemas.microsoft.com/office/drawing/2014/main" id="{1C36FCBD-4724-4324-8F3B-E74E067F9A6D}"/>
+              </a:ext>
+            </a:extLst>
+          </p:cNvPr>
+          <p:cNvSpPr txBox="1"/>
+          <p:nvPr/>
+        </p:nvSpPr>
+        <p:spPr>
+          <a:xfrm>
+            <a:off x="3101008" y="2422102"/>
+            <a:ext cx="1962979" cy="584775"/>
+          </a:xfrm>
+          <a:prstGeom prst="rect">
+            <a:avLst/>
+          </a:prstGeom>
+          <a:solidFill>
+            <a:schemeClr val="bg1"/>
+          </a:solidFill>
+          <a:ln>
+            <a:solidFill>
+              <a:schemeClr val="bg1"/>
+            </a:solidFill>
+          </a:ln>
+        </p:spPr>
+        <p:txBody>
+          <a:bodyPr wrap="square" rtlCol="0">
+            <a:spAutoFit/>
+          </a:bodyPr>
+          <a:lstStyle/>
+          <a:p>
+            <a:r>
+              <a:rPr lang="en-GB" sz="1600" dirty="0">
+                <a:solidFill>
+                  <a:srgbClr val="00B050"/>
+                </a:solidFill>
+                <a:latin typeface="Arial" panose="020B0604020202020204" pitchFamily="34" charset="0"/>
+                <a:cs typeface="Arial" panose="020B0604020202020204" pitchFamily="34" charset="0"/>
+              </a:rPr>
+              <a:t>Buying = punished</a:t>
+            </a:r>
+          </a:p>
+          <a:p>
+            <a:r>
+              <a:rPr lang="en-GB" sz="1600" dirty="0">
+                <a:solidFill>
+                  <a:srgbClr val="00B050"/>
+                </a:solidFill>
+                <a:latin typeface="Arial" panose="020B0604020202020204" pitchFamily="34" charset="0"/>
+                <a:cs typeface="Arial" panose="020B0604020202020204" pitchFamily="34" charset="0"/>
+              </a:rPr>
+              <a:t>Selling = rewarded</a:t>
+            </a:r>
           </a:p>
         </p:txBody>
       </p:sp>

</xml_diff>